<commit_message>
Update Bitcoin icon Lightning Network
prepare for logo
cleaned discarded versions to "_arhive/_icon lightning" network  and "_arhive/logo lightning *"
</commit_message>
<xml_diff>
--- a/bitcoin logo lightning network/bitcoin logo lightning network.pptx
+++ b/bitcoin logo lightning network/bitcoin logo lightning network.pptx
@@ -116,8 +116,6 @@
 <p1510:revInfo xmlns:a="http://schemas.openxmlformats.org/drawingml/2006/main" xmlns:r="http://schemas.openxmlformats.org/officeDocument/2006/relationships" xmlns:p1510="http://schemas.microsoft.com/office/powerpoint/2015/10/main">
   <p1510:revLst>
     <p1510:client id="{2218B6E8-24DD-4828-A50C-A6BF04826C01}" v="63" dt="2024-03-09T05:52:30.637"/>
-    <p1510:client id="{3A57CA03-FE34-4A8E-A273-5AD7ABDF0FFB}" v="458" dt="2024-03-08T22:01:29.377"/>
-    <p1510:client id="{4ED1C821-59B5-4C36-800E-36BF6E3A404E}" v="19" dt="2024-03-09T04:13:07.696"/>
   </p1510:revLst>
 </p1510:revInfo>
 </file>
@@ -127,12 +125,12 @@
   <pc:docChgLst>
     <pc:chgData name="Tomi Lind" userId="73fe6e1701840021" providerId="LiveId" clId="{2218B6E8-24DD-4828-A50C-A6BF04826C01}"/>
     <pc:docChg chg="undo redo custSel modSld">
-      <pc:chgData name="Tomi Lind" userId="73fe6e1701840021" providerId="LiveId" clId="{2218B6E8-24DD-4828-A50C-A6BF04826C01}" dt="2024-03-09T05:52:30.637" v="98"/>
+      <pc:chgData name="Tomi Lind" userId="73fe6e1701840021" providerId="LiveId" clId="{2218B6E8-24DD-4828-A50C-A6BF04826C01}" dt="2024-03-15T17:41:23.356" v="100" actId="478"/>
       <pc:docMkLst>
         <pc:docMk/>
       </pc:docMkLst>
       <pc:sldChg chg="addSp delSp modSp mod setBg">
-        <pc:chgData name="Tomi Lind" userId="73fe6e1701840021" providerId="LiveId" clId="{2218B6E8-24DD-4828-A50C-A6BF04826C01}" dt="2024-03-09T05:52:30.637" v="98"/>
+        <pc:chgData name="Tomi Lind" userId="73fe6e1701840021" providerId="LiveId" clId="{2218B6E8-24DD-4828-A50C-A6BF04826C01}" dt="2024-03-15T17:41:23.356" v="100" actId="478"/>
         <pc:sldMkLst>
           <pc:docMk/>
           <pc:sldMk cId="560821162" sldId="256"/>
@@ -162,7 +160,7 @@
           </ac:grpSpMkLst>
         </pc:grpChg>
         <pc:picChg chg="add del mod">
-          <ac:chgData name="Tomi Lind" userId="73fe6e1701840021" providerId="LiveId" clId="{2218B6E8-24DD-4828-A50C-A6BF04826C01}" dt="2024-03-09T05:51:23.170" v="81" actId="207"/>
+          <ac:chgData name="Tomi Lind" userId="73fe6e1701840021" providerId="LiveId" clId="{2218B6E8-24DD-4828-A50C-A6BF04826C01}" dt="2024-03-15T17:41:23.356" v="100" actId="478"/>
           <ac:picMkLst>
             <pc:docMk/>
             <pc:sldMk cId="560821162" sldId="256"/>
@@ -890,7 +888,7 @@
           <a:p>
             <a:fld id="{75D0A277-1334-4236-85D9-B2D317AA20BB}" type="datetimeFigureOut">
               <a:rPr lang="en-FI" smtClean="0"/>
-              <a:t>09/03/2024</a:t>
+              <a:t>15/03/2024</a:t>
             </a:fld>
             <a:endParaRPr lang="en-FI"/>
           </a:p>
@@ -1060,7 +1058,7 @@
           <a:p>
             <a:fld id="{75D0A277-1334-4236-85D9-B2D317AA20BB}" type="datetimeFigureOut">
               <a:rPr lang="en-FI" smtClean="0"/>
-              <a:t>09/03/2024</a:t>
+              <a:t>15/03/2024</a:t>
             </a:fld>
             <a:endParaRPr lang="en-FI"/>
           </a:p>
@@ -1240,7 +1238,7 @@
           <a:p>
             <a:fld id="{75D0A277-1334-4236-85D9-B2D317AA20BB}" type="datetimeFigureOut">
               <a:rPr lang="en-FI" smtClean="0"/>
-              <a:t>09/03/2024</a:t>
+              <a:t>15/03/2024</a:t>
             </a:fld>
             <a:endParaRPr lang="en-FI"/>
           </a:p>
@@ -1410,7 +1408,7 @@
           <a:p>
             <a:fld id="{75D0A277-1334-4236-85D9-B2D317AA20BB}" type="datetimeFigureOut">
               <a:rPr lang="en-FI" smtClean="0"/>
-              <a:t>09/03/2024</a:t>
+              <a:t>15/03/2024</a:t>
             </a:fld>
             <a:endParaRPr lang="en-FI"/>
           </a:p>
@@ -1656,7 +1654,7 @@
           <a:p>
             <a:fld id="{75D0A277-1334-4236-85D9-B2D317AA20BB}" type="datetimeFigureOut">
               <a:rPr lang="en-FI" smtClean="0"/>
-              <a:t>09/03/2024</a:t>
+              <a:t>15/03/2024</a:t>
             </a:fld>
             <a:endParaRPr lang="en-FI"/>
           </a:p>
@@ -1888,7 +1886,7 @@
           <a:p>
             <a:fld id="{75D0A277-1334-4236-85D9-B2D317AA20BB}" type="datetimeFigureOut">
               <a:rPr lang="en-FI" smtClean="0"/>
-              <a:t>09/03/2024</a:t>
+              <a:t>15/03/2024</a:t>
             </a:fld>
             <a:endParaRPr lang="en-FI"/>
           </a:p>
@@ -2255,7 +2253,7 @@
           <a:p>
             <a:fld id="{75D0A277-1334-4236-85D9-B2D317AA20BB}" type="datetimeFigureOut">
               <a:rPr lang="en-FI" smtClean="0"/>
-              <a:t>09/03/2024</a:t>
+              <a:t>15/03/2024</a:t>
             </a:fld>
             <a:endParaRPr lang="en-FI"/>
           </a:p>
@@ -2373,7 +2371,7 @@
           <a:p>
             <a:fld id="{75D0A277-1334-4236-85D9-B2D317AA20BB}" type="datetimeFigureOut">
               <a:rPr lang="en-FI" smtClean="0"/>
-              <a:t>09/03/2024</a:t>
+              <a:t>15/03/2024</a:t>
             </a:fld>
             <a:endParaRPr lang="en-FI"/>
           </a:p>
@@ -2468,7 +2466,7 @@
           <a:p>
             <a:fld id="{75D0A277-1334-4236-85D9-B2D317AA20BB}" type="datetimeFigureOut">
               <a:rPr lang="en-FI" smtClean="0"/>
-              <a:t>09/03/2024</a:t>
+              <a:t>15/03/2024</a:t>
             </a:fld>
             <a:endParaRPr lang="en-FI"/>
           </a:p>
@@ -2745,7 +2743,7 @@
           <a:p>
             <a:fld id="{75D0A277-1334-4236-85D9-B2D317AA20BB}" type="datetimeFigureOut">
               <a:rPr lang="en-FI" smtClean="0"/>
-              <a:t>09/03/2024</a:t>
+              <a:t>15/03/2024</a:t>
             </a:fld>
             <a:endParaRPr lang="en-FI"/>
           </a:p>
@@ -3002,7 +3000,7 @@
           <a:p>
             <a:fld id="{75D0A277-1334-4236-85D9-B2D317AA20BB}" type="datetimeFigureOut">
               <a:rPr lang="en-FI" smtClean="0"/>
-              <a:t>09/03/2024</a:t>
+              <a:t>15/03/2024</a:t>
             </a:fld>
             <a:endParaRPr lang="en-FI"/>
           </a:p>
@@ -3215,7 +3213,7 @@
           <a:p>
             <a:fld id="{75D0A277-1334-4236-85D9-B2D317AA20BB}" type="datetimeFigureOut">
               <a:rPr lang="en-FI" smtClean="0"/>
-              <a:t>09/03/2024</a:t>
+              <a:t>15/03/2024</a:t>
             </a:fld>
             <a:endParaRPr lang="en-FI"/>
           </a:p>

</xml_diff>

<commit_message>
Update Bitcoin icon Lightning
</commit_message>
<xml_diff>
--- a/bitcoin logo lightning network/bitcoin logo lightning network.pptx
+++ b/bitcoin logo lightning network/bitcoin logo lightning network.pptx
@@ -116,8 +116,6 @@
 <p1510:revInfo xmlns:a="http://schemas.openxmlformats.org/drawingml/2006/main" xmlns:r="http://schemas.openxmlformats.org/officeDocument/2006/relationships" xmlns:p1510="http://schemas.microsoft.com/office/powerpoint/2015/10/main">
   <p1510:revLst>
     <p1510:client id="{2218B6E8-24DD-4828-A50C-A6BF04826C01}" v="63" dt="2024-03-09T05:52:30.637"/>
-    <p1510:client id="{3A57CA03-FE34-4A8E-A273-5AD7ABDF0FFB}" v="458" dt="2024-03-08T22:01:29.377"/>
-    <p1510:client id="{4ED1C821-59B5-4C36-800E-36BF6E3A404E}" v="19" dt="2024-03-09T04:13:07.696"/>
   </p1510:revLst>
 </p1510:revInfo>
 </file>
@@ -127,12 +125,12 @@
   <pc:docChgLst>
     <pc:chgData name="Tomi Lind" userId="73fe6e1701840021" providerId="LiveId" clId="{2218B6E8-24DD-4828-A50C-A6BF04826C01}"/>
     <pc:docChg chg="undo redo custSel modSld">
-      <pc:chgData name="Tomi Lind" userId="73fe6e1701840021" providerId="LiveId" clId="{2218B6E8-24DD-4828-A50C-A6BF04826C01}" dt="2024-03-09T05:52:30.637" v="98"/>
+      <pc:chgData name="Tomi Lind" userId="73fe6e1701840021" providerId="LiveId" clId="{2218B6E8-24DD-4828-A50C-A6BF04826C01}" dt="2024-03-15T17:41:23.356" v="100" actId="478"/>
       <pc:docMkLst>
         <pc:docMk/>
       </pc:docMkLst>
       <pc:sldChg chg="addSp delSp modSp mod setBg">
-        <pc:chgData name="Tomi Lind" userId="73fe6e1701840021" providerId="LiveId" clId="{2218B6E8-24DD-4828-A50C-A6BF04826C01}" dt="2024-03-09T05:52:30.637" v="98"/>
+        <pc:chgData name="Tomi Lind" userId="73fe6e1701840021" providerId="LiveId" clId="{2218B6E8-24DD-4828-A50C-A6BF04826C01}" dt="2024-03-15T17:41:23.356" v="100" actId="478"/>
         <pc:sldMkLst>
           <pc:docMk/>
           <pc:sldMk cId="560821162" sldId="256"/>
@@ -162,7 +160,7 @@
           </ac:grpSpMkLst>
         </pc:grpChg>
         <pc:picChg chg="add del mod">
-          <ac:chgData name="Tomi Lind" userId="73fe6e1701840021" providerId="LiveId" clId="{2218B6E8-24DD-4828-A50C-A6BF04826C01}" dt="2024-03-09T05:51:23.170" v="81" actId="207"/>
+          <ac:chgData name="Tomi Lind" userId="73fe6e1701840021" providerId="LiveId" clId="{2218B6E8-24DD-4828-A50C-A6BF04826C01}" dt="2024-03-15T17:41:23.356" v="100" actId="478"/>
           <ac:picMkLst>
             <pc:docMk/>
             <pc:sldMk cId="560821162" sldId="256"/>
@@ -890,7 +888,7 @@
           <a:p>
             <a:fld id="{75D0A277-1334-4236-85D9-B2D317AA20BB}" type="datetimeFigureOut">
               <a:rPr lang="en-FI" smtClean="0"/>
-              <a:t>09/03/2024</a:t>
+              <a:t>15/03/2024</a:t>
             </a:fld>
             <a:endParaRPr lang="en-FI"/>
           </a:p>
@@ -1060,7 +1058,7 @@
           <a:p>
             <a:fld id="{75D0A277-1334-4236-85D9-B2D317AA20BB}" type="datetimeFigureOut">
               <a:rPr lang="en-FI" smtClean="0"/>
-              <a:t>09/03/2024</a:t>
+              <a:t>15/03/2024</a:t>
             </a:fld>
             <a:endParaRPr lang="en-FI"/>
           </a:p>
@@ -1240,7 +1238,7 @@
           <a:p>
             <a:fld id="{75D0A277-1334-4236-85D9-B2D317AA20BB}" type="datetimeFigureOut">
               <a:rPr lang="en-FI" smtClean="0"/>
-              <a:t>09/03/2024</a:t>
+              <a:t>15/03/2024</a:t>
             </a:fld>
             <a:endParaRPr lang="en-FI"/>
           </a:p>
@@ -1410,7 +1408,7 @@
           <a:p>
             <a:fld id="{75D0A277-1334-4236-85D9-B2D317AA20BB}" type="datetimeFigureOut">
               <a:rPr lang="en-FI" smtClean="0"/>
-              <a:t>09/03/2024</a:t>
+              <a:t>15/03/2024</a:t>
             </a:fld>
             <a:endParaRPr lang="en-FI"/>
           </a:p>
@@ -1656,7 +1654,7 @@
           <a:p>
             <a:fld id="{75D0A277-1334-4236-85D9-B2D317AA20BB}" type="datetimeFigureOut">
               <a:rPr lang="en-FI" smtClean="0"/>
-              <a:t>09/03/2024</a:t>
+              <a:t>15/03/2024</a:t>
             </a:fld>
             <a:endParaRPr lang="en-FI"/>
           </a:p>
@@ -1888,7 +1886,7 @@
           <a:p>
             <a:fld id="{75D0A277-1334-4236-85D9-B2D317AA20BB}" type="datetimeFigureOut">
               <a:rPr lang="en-FI" smtClean="0"/>
-              <a:t>09/03/2024</a:t>
+              <a:t>15/03/2024</a:t>
             </a:fld>
             <a:endParaRPr lang="en-FI"/>
           </a:p>
@@ -2255,7 +2253,7 @@
           <a:p>
             <a:fld id="{75D0A277-1334-4236-85D9-B2D317AA20BB}" type="datetimeFigureOut">
               <a:rPr lang="en-FI" smtClean="0"/>
-              <a:t>09/03/2024</a:t>
+              <a:t>15/03/2024</a:t>
             </a:fld>
             <a:endParaRPr lang="en-FI"/>
           </a:p>
@@ -2373,7 +2371,7 @@
           <a:p>
             <a:fld id="{75D0A277-1334-4236-85D9-B2D317AA20BB}" type="datetimeFigureOut">
               <a:rPr lang="en-FI" smtClean="0"/>
-              <a:t>09/03/2024</a:t>
+              <a:t>15/03/2024</a:t>
             </a:fld>
             <a:endParaRPr lang="en-FI"/>
           </a:p>
@@ -2468,7 +2466,7 @@
           <a:p>
             <a:fld id="{75D0A277-1334-4236-85D9-B2D317AA20BB}" type="datetimeFigureOut">
               <a:rPr lang="en-FI" smtClean="0"/>
-              <a:t>09/03/2024</a:t>
+              <a:t>15/03/2024</a:t>
             </a:fld>
             <a:endParaRPr lang="en-FI"/>
           </a:p>
@@ -2745,7 +2743,7 @@
           <a:p>
             <a:fld id="{75D0A277-1334-4236-85D9-B2D317AA20BB}" type="datetimeFigureOut">
               <a:rPr lang="en-FI" smtClean="0"/>
-              <a:t>09/03/2024</a:t>
+              <a:t>15/03/2024</a:t>
             </a:fld>
             <a:endParaRPr lang="en-FI"/>
           </a:p>
@@ -3002,7 +3000,7 @@
           <a:p>
             <a:fld id="{75D0A277-1334-4236-85D9-B2D317AA20BB}" type="datetimeFigureOut">
               <a:rPr lang="en-FI" smtClean="0"/>
-              <a:t>09/03/2024</a:t>
+              <a:t>15/03/2024</a:t>
             </a:fld>
             <a:endParaRPr lang="en-FI"/>
           </a:p>
@@ -3215,7 +3213,7 @@
           <a:p>
             <a:fld id="{75D0A277-1334-4236-85D9-B2D317AA20BB}" type="datetimeFigureOut">
               <a:rPr lang="en-FI" smtClean="0"/>
-              <a:t>09/03/2024</a:t>
+              <a:t>15/03/2024</a:t>
             </a:fld>
             <a:endParaRPr lang="en-FI"/>
           </a:p>

</xml_diff>